<commit_message>
added resources for Week 5 lab.
</commit_message>
<xml_diff>
--- a/Week-5/Week5slides.pptx
+++ b/Week-5/Week5slides.pptx
@@ -4198,7 +4198,7 @@
           <a:graphicData uri="http://schemas.openxmlformats.org/presentationml/2006/ole">
             <mc:AlternateContent xmlns:mc="http://schemas.openxmlformats.org/markup-compatibility/2006">
               <mc:Choice xmlns:v="urn:schemas-microsoft-com:vml" Requires="v">
-                <p:oleObj spid="_x0000_s2119" name="Equation" r:id="rId3" imgW="863600" imgH="241300" progId="Equation.3">
+                <p:oleObj spid="_x0000_s2133" name="Equation" r:id="rId3" imgW="863600" imgH="241300" progId="Equation.3">
                   <p:embed/>
                 </p:oleObj>
               </mc:Choice>
@@ -4255,7 +4255,7 @@
           <a:graphicData uri="http://schemas.openxmlformats.org/presentationml/2006/ole">
             <mc:AlternateContent xmlns:mc="http://schemas.openxmlformats.org/markup-compatibility/2006">
               <mc:Choice xmlns:v="urn:schemas-microsoft-com:vml" Requires="v">
-                <p:oleObj spid="_x0000_s2120" name="Equation" r:id="rId5" imgW="139700" imgH="165100" progId="Equation.3">
+                <p:oleObj spid="_x0000_s2134" name="Equation" r:id="rId5" imgW="139700" imgH="165100" progId="Equation.3">
                   <p:embed/>
                 </p:oleObj>
               </mc:Choice>
@@ -4312,7 +4312,7 @@
           <a:graphicData uri="http://schemas.openxmlformats.org/presentationml/2006/ole">
             <mc:AlternateContent xmlns:mc="http://schemas.openxmlformats.org/markup-compatibility/2006">
               <mc:Choice xmlns:v="urn:schemas-microsoft-com:vml" Requires="v">
-                <p:oleObj spid="_x0000_s2121" name="Equation" r:id="rId7" imgW="114300" imgH="165100" progId="Equation.3">
+                <p:oleObj spid="_x0000_s2135" name="Equation" r:id="rId7" imgW="114300" imgH="165100" progId="Equation.3">
                   <p:embed/>
                 </p:oleObj>
               </mc:Choice>
@@ -4369,7 +4369,7 @@
           <a:graphicData uri="http://schemas.openxmlformats.org/presentationml/2006/ole">
             <mc:AlternateContent xmlns:mc="http://schemas.openxmlformats.org/markup-compatibility/2006">
               <mc:Choice xmlns:v="urn:schemas-microsoft-com:vml" Requires="v">
-                <p:oleObj spid="_x0000_s2122" name="Equation" r:id="rId9" imgW="863600" imgH="241300" progId="Equation.3">
+                <p:oleObj spid="_x0000_s2136" name="Equation" r:id="rId9" imgW="863600" imgH="241300" progId="Equation.3">
                   <p:embed/>
                 </p:oleObj>
               </mc:Choice>
@@ -4504,7 +4504,7 @@
           <a:graphicData uri="http://schemas.openxmlformats.org/presentationml/2006/ole">
             <mc:AlternateContent xmlns:mc="http://schemas.openxmlformats.org/markup-compatibility/2006">
               <mc:Choice xmlns:v="urn:schemas-microsoft-com:vml" Requires="v">
-                <p:oleObj spid="_x0000_s2123" name="Equation" r:id="rId11" imgW="723900" imgH="203200" progId="Equation.3">
+                <p:oleObj spid="_x0000_s2137" name="Equation" r:id="rId11" imgW="723900" imgH="203200" progId="Equation.3">
                   <p:embed/>
                 </p:oleObj>
               </mc:Choice>
@@ -4561,7 +4561,7 @@
           <a:graphicData uri="http://schemas.openxmlformats.org/presentationml/2006/ole">
             <mc:AlternateContent xmlns:mc="http://schemas.openxmlformats.org/markup-compatibility/2006">
               <mc:Choice xmlns:v="urn:schemas-microsoft-com:vml" Requires="v">
-                <p:oleObj spid="_x0000_s2124" name="Equation" r:id="rId13" imgW="1803400" imgH="279400" progId="Equation.3">
+                <p:oleObj spid="_x0000_s2138" name="Equation" r:id="rId13" imgW="1803400" imgH="279400" progId="Equation.3">
                   <p:embed/>
                 </p:oleObj>
               </mc:Choice>
@@ -4671,7 +4671,7 @@
           <a:graphicData uri="http://schemas.openxmlformats.org/presentationml/2006/ole">
             <mc:AlternateContent xmlns:mc="http://schemas.openxmlformats.org/markup-compatibility/2006">
               <mc:Choice xmlns:v="urn:schemas-microsoft-com:vml" Requires="v">
-                <p:oleObj spid="_x0000_s2125" name="Equation" r:id="rId15" imgW="2311400" imgH="457200" progId="Equation.3">
+                <p:oleObj spid="_x0000_s2139" name="Equation" r:id="rId15" imgW="2311400" imgH="457200" progId="Equation.3">
                   <p:embed/>
                 </p:oleObj>
               </mc:Choice>
@@ -24395,7 +24395,7 @@
           <a:graphicData uri="http://schemas.openxmlformats.org/presentationml/2006/ole">
             <mc:AlternateContent xmlns:mc="http://schemas.openxmlformats.org/markup-compatibility/2006">
               <mc:Choice xmlns:v="urn:schemas-microsoft-com:vml" Requires="v">
-                <p:oleObj spid="_x0000_s1135" name="Equation" r:id="rId3" imgW="139700" imgH="165100" progId="Equation.3">
+                <p:oleObj spid="_x0000_s1155" name="Equation" r:id="rId3" imgW="139700" imgH="165100" progId="Equation.3">
                   <p:embed/>
                 </p:oleObj>
               </mc:Choice>
@@ -24538,7 +24538,7 @@
           <a:graphicData uri="http://schemas.openxmlformats.org/presentationml/2006/ole">
             <mc:AlternateContent xmlns:mc="http://schemas.openxmlformats.org/markup-compatibility/2006">
               <mc:Choice xmlns:v="urn:schemas-microsoft-com:vml" Requires="v">
-                <p:oleObj spid="_x0000_s1136" name="Equation" r:id="rId5" imgW="152400" imgH="215900" progId="Equation.3">
+                <p:oleObj spid="_x0000_s1156" name="Equation" r:id="rId5" imgW="152400" imgH="215900" progId="Equation.3">
                   <p:embed/>
                 </p:oleObj>
               </mc:Choice>
@@ -24595,7 +24595,7 @@
           <a:graphicData uri="http://schemas.openxmlformats.org/presentationml/2006/ole">
             <mc:AlternateContent xmlns:mc="http://schemas.openxmlformats.org/markup-compatibility/2006">
               <mc:Choice xmlns:v="urn:schemas-microsoft-com:vml" Requires="v">
-                <p:oleObj spid="_x0000_s1137" name="Equation" r:id="rId7" imgW="114300" imgH="165100" progId="Equation.3">
+                <p:oleObj spid="_x0000_s1157" name="Equation" r:id="rId7" imgW="114300" imgH="165100" progId="Equation.3">
                   <p:embed/>
                 </p:oleObj>
               </mc:Choice>
@@ -24702,7 +24702,7 @@
           <a:graphicData uri="http://schemas.openxmlformats.org/presentationml/2006/ole">
             <mc:AlternateContent xmlns:mc="http://schemas.openxmlformats.org/markup-compatibility/2006">
               <mc:Choice xmlns:v="urn:schemas-microsoft-com:vml" Requires="v">
-                <p:oleObj spid="_x0000_s1138" name="Equation" r:id="rId9" imgW="127000" imgH="177800" progId="Equation.3">
+                <p:oleObj spid="_x0000_s1158" name="Equation" r:id="rId9" imgW="127000" imgH="177800" progId="Equation.3">
                   <p:embed/>
                 </p:oleObj>
               </mc:Choice>
@@ -24834,7 +24834,7 @@
           <a:graphicData uri="http://schemas.openxmlformats.org/presentationml/2006/ole">
             <mc:AlternateContent xmlns:mc="http://schemas.openxmlformats.org/markup-compatibility/2006">
               <mc:Choice xmlns:v="urn:schemas-microsoft-com:vml" Requires="v">
-                <p:oleObj spid="_x0000_s1139" name="Equation" r:id="rId11" imgW="863600" imgH="241300" progId="Equation.3">
+                <p:oleObj spid="_x0000_s1159" name="Equation" r:id="rId11" imgW="863600" imgH="241300" progId="Equation.3">
                   <p:embed/>
                 </p:oleObj>
               </mc:Choice>
@@ -24891,7 +24891,7 @@
           <a:graphicData uri="http://schemas.openxmlformats.org/presentationml/2006/ole">
             <mc:AlternateContent xmlns:mc="http://schemas.openxmlformats.org/markup-compatibility/2006">
               <mc:Choice xmlns:v="urn:schemas-microsoft-com:vml" Requires="v">
-                <p:oleObj spid="_x0000_s1140" name="Equation" r:id="rId13" imgW="139700" imgH="165100" progId="Equation.3">
+                <p:oleObj spid="_x0000_s1160" name="Equation" r:id="rId13" imgW="139700" imgH="165100" progId="Equation.3">
                   <p:embed/>
                 </p:oleObj>
               </mc:Choice>
@@ -24948,7 +24948,7 @@
           <a:graphicData uri="http://schemas.openxmlformats.org/presentationml/2006/ole">
             <mc:AlternateContent xmlns:mc="http://schemas.openxmlformats.org/markup-compatibility/2006">
               <mc:Choice xmlns:v="urn:schemas-microsoft-com:vml" Requires="v">
-                <p:oleObj spid="_x0000_s1141" name="Equation" r:id="rId15" imgW="114300" imgH="165100" progId="Equation.3">
+                <p:oleObj spid="_x0000_s1161" name="Equation" r:id="rId15" imgW="114300" imgH="165100" progId="Equation.3">
                   <p:embed/>
                 </p:oleObj>
               </mc:Choice>
@@ -25005,7 +25005,7 @@
           <a:graphicData uri="http://schemas.openxmlformats.org/presentationml/2006/ole">
             <mc:AlternateContent xmlns:mc="http://schemas.openxmlformats.org/markup-compatibility/2006">
               <mc:Choice xmlns:v="urn:schemas-microsoft-com:vml" Requires="v">
-                <p:oleObj spid="_x0000_s1142" name="Equation" r:id="rId16" imgW="863600" imgH="241300" progId="Equation.3">
+                <p:oleObj spid="_x0000_s1162" name="Equation" r:id="rId16" imgW="863600" imgH="241300" progId="Equation.3">
                   <p:embed/>
                 </p:oleObj>
               </mc:Choice>
@@ -25140,7 +25140,7 @@
           <a:graphicData uri="http://schemas.openxmlformats.org/presentationml/2006/ole">
             <mc:AlternateContent xmlns:mc="http://schemas.openxmlformats.org/markup-compatibility/2006">
               <mc:Choice xmlns:v="urn:schemas-microsoft-com:vml" Requires="v">
-                <p:oleObj spid="_x0000_s1143" name="Equation" r:id="rId18" imgW="723900" imgH="203200" progId="Equation.3">
+                <p:oleObj spid="_x0000_s1163" name="Equation" r:id="rId18" imgW="723900" imgH="203200" progId="Equation.3">
                   <p:embed/>
                 </p:oleObj>
               </mc:Choice>
@@ -25197,7 +25197,7 @@
           <a:graphicData uri="http://schemas.openxmlformats.org/presentationml/2006/ole">
             <mc:AlternateContent xmlns:mc="http://schemas.openxmlformats.org/markup-compatibility/2006">
               <mc:Choice xmlns:v="urn:schemas-microsoft-com:vml" Requires="v">
-                <p:oleObj spid="_x0000_s1144" name="Equation" r:id="rId20" imgW="1803400" imgH="279400" progId="Equation.3">
+                <p:oleObj spid="_x0000_s1164" name="Equation" r:id="rId20" imgW="1803400" imgH="279400" progId="Equation.3">
                   <p:embed/>
                 </p:oleObj>
               </mc:Choice>

</xml_diff>